<commit_message>
updated link in slides
</commit_message>
<xml_diff>
--- a/ngsgu/cancergenomics/1710/slides/cancer_genomics.pptx
+++ b/ngsgu/cancergenomics/1710/slides/cancer_genomics.pptx
@@ -19336,7 +19336,25 @@
               <a:rPr lang="en-US" sz="3200" u="sng" dirty="0">
                 <a:hlinkClick r:id="rId2"/>
               </a:rPr>
-              <a:t>http://scilifelab.github.io/courses/ngsgu/cancergenomics/1610/ </a:t>
+              <a:t>http://scilifelab.github.io/courses/ngsgu/cancergenomics</a:t>
+            </a:r>
+            <a:r>
+              <a:rPr lang="en-US" sz="3200" u="sng">
+                <a:hlinkClick r:id="rId2"/>
+              </a:rPr>
+              <a:t>/</a:t>
+            </a:r>
+            <a:r>
+              <a:rPr lang="en-US" sz="3200" u="sng" smtClean="0">
+                <a:hlinkClick r:id="rId2"/>
+              </a:rPr>
+              <a:t>1710</a:t>
+            </a:r>
+            <a:r>
+              <a:rPr lang="en-US" sz="3200" u="sng" dirty="0">
+                <a:hlinkClick r:id="rId2"/>
+              </a:rPr>
+              <a:t>/ </a:t>
             </a:r>
             <a:endParaRPr lang="en-US" sz="3200" dirty="0"/>
           </a:p>

</xml_diff>

<commit_message>
added slides in pptx format
</commit_message>
<xml_diff>
--- a/ngsgu/cancergenomics/1710/slides/cancer_genomics.pptx
+++ b/ngsgu/cancergenomics/1710/slides/cancer_genomics.pptx
@@ -13,8 +13,8 @@
     <p:sldId id="259" r:id="rId4"/>
     <p:sldId id="272" r:id="rId5"/>
     <p:sldId id="261" r:id="rId6"/>
-    <p:sldId id="285" r:id="rId7"/>
-    <p:sldId id="269" r:id="rId8"/>
+    <p:sldId id="269" r:id="rId7"/>
+    <p:sldId id="285" r:id="rId8"/>
     <p:sldId id="279" r:id="rId9"/>
     <p:sldId id="280" r:id="rId10"/>
     <p:sldId id="287" r:id="rId11"/>
@@ -928,8 +928,41 @@
                 <a:latin typeface="Arial" charset="0"/>
                 <a:cs typeface="msgothic" charset="0"/>
               </a:rPr>
-              <a:t> types. TGF-β, transforming growth factor–β.</a:t>
-            </a:r>
+              <a:t> types. TGF-β, transforming growth factor–β</a:t>
+            </a:r>
+            <a:r>
+              <a:rPr lang="en-GB" dirty="0" smtClean="0">
+                <a:latin typeface="Arial" charset="0"/>
+                <a:cs typeface="msgothic" charset="0"/>
+              </a:rPr>
+              <a:t>. PI13 </a:t>
+            </a:r>
+            <a:r>
+              <a:rPr lang="en-US" sz="1200" kern="1200" dirty="0" err="1" smtClean="0">
+                <a:solidFill>
+                  <a:srgbClr val="000000"/>
+                </a:solidFill>
+                <a:latin typeface="Times New Roman" charset="0"/>
+                <a:ea typeface="ＭＳ Ｐゴシック" charset="0"/>
+                <a:cs typeface="+mn-cs"/>
+              </a:rPr>
+              <a:t>phosphoinositide</a:t>
+            </a:r>
+            <a:r>
+              <a:rPr lang="en-US" sz="1200" kern="1200" dirty="0" smtClean="0">
+                <a:solidFill>
+                  <a:srgbClr val="000000"/>
+                </a:solidFill>
+                <a:latin typeface="Times New Roman" charset="0"/>
+                <a:ea typeface="ＭＳ Ｐゴシック" charset="0"/>
+                <a:cs typeface="+mn-cs"/>
+              </a:rPr>
+              <a:t> 3-kinase (PI3K)</a:t>
+            </a:r>
+            <a:endParaRPr lang="en-GB" dirty="0">
+              <a:latin typeface="Arial" charset="0"/>
+              <a:cs typeface="msgothic" charset="0"/>
+            </a:endParaRPr>
           </a:p>
         </p:txBody>
       </p:sp>
@@ -1638,7 +1671,95 @@
             </a:r>
             <a:r>
               <a:rPr lang="en-US" baseline="0" dirty="0" smtClean="0"/>
-              <a:t> classifier – germ line or somatic</a:t>
+              <a:t> classifier – germ line or </a:t>
+            </a:r>
+            <a:r>
+              <a:rPr lang="en-US" baseline="0" dirty="0" smtClean="0"/>
+              <a:t>somatic</a:t>
+            </a:r>
+          </a:p>
+          <a:p>
+            <a:endParaRPr lang="en-US" dirty="0" smtClean="0"/>
+          </a:p>
+          <a:p>
+            <a:r>
+              <a:rPr lang="en-US" dirty="0" smtClean="0"/>
+              <a:t>(</a:t>
+            </a:r>
+            <a:r>
+              <a:rPr lang="en-US" dirty="0" err="1" smtClean="0"/>
+              <a:t>i</a:t>
+            </a:r>
+            <a:r>
+              <a:rPr lang="en-US" dirty="0" smtClean="0"/>
+              <a:t>) a reference model, M0, which assumes there is no variant at the site and any observed </a:t>
+            </a:r>
+            <a:r>
+              <a:rPr lang="en-US" dirty="0" err="1" smtClean="0"/>
+              <a:t>nonreference</a:t>
+            </a:r>
+            <a:r>
+              <a:rPr lang="en-US" dirty="0" smtClean="0"/>
+              <a:t> bases are due to random sequencing errors, and (ii) a variant model, </a:t>
+            </a:r>
+            <a:r>
+              <a:rPr lang="en-US" sz="1200" kern="1200" dirty="0" smtClean="0">
+                <a:solidFill>
+                  <a:schemeClr val="tx1"/>
+                </a:solidFill>
+                <a:latin typeface="+mn-lt"/>
+                <a:ea typeface="+mn-ea"/>
+                <a:cs typeface="+mn-cs"/>
+              </a:rPr>
+              <a:t>which assumes the site contains a true variant allele </a:t>
+            </a:r>
+            <a:r>
+              <a:rPr lang="en-US" sz="1200" i="1" kern="1200" dirty="0" smtClean="0">
+                <a:solidFill>
+                  <a:schemeClr val="tx1"/>
+                </a:solidFill>
+                <a:latin typeface="+mn-lt"/>
+                <a:ea typeface="+mn-ea"/>
+                <a:cs typeface="+mn-cs"/>
+              </a:rPr>
+              <a:t>m</a:t>
+            </a:r>
+            <a:r>
+              <a:rPr lang="en-US" sz="1200" i="0" kern="1200" dirty="0" smtClean="0">
+                <a:solidFill>
+                  <a:schemeClr val="tx1"/>
+                </a:solidFill>
+                <a:latin typeface="+mn-lt"/>
+                <a:ea typeface="+mn-ea"/>
+                <a:cs typeface="+mn-cs"/>
+              </a:rPr>
+              <a:t> at allele fraction </a:t>
+            </a:r>
+            <a:r>
+              <a:rPr lang="en-US" sz="1200" i="1" kern="1200" dirty="0" smtClean="0">
+                <a:solidFill>
+                  <a:schemeClr val="tx1"/>
+                </a:solidFill>
+                <a:latin typeface="+mn-lt"/>
+                <a:ea typeface="+mn-ea"/>
+                <a:cs typeface="+mn-cs"/>
+              </a:rPr>
+              <a:t>f</a:t>
+            </a:r>
+            <a:r>
+              <a:rPr lang="en-US" sz="1200" i="0" kern="1200" dirty="0" smtClean="0">
+                <a:solidFill>
+                  <a:schemeClr val="tx1"/>
+                </a:solidFill>
+                <a:latin typeface="+mn-lt"/>
+                <a:ea typeface="+mn-ea"/>
+                <a:cs typeface="+mn-cs"/>
+              </a:rPr>
+              <a:t> in addition to sequencing errors. </a:t>
+            </a:r>
+            <a:r>
+              <a:rPr lang="en-US" dirty="0" smtClean="0"/>
+              <a:t> </a:t>
             </a:r>
             <a:endParaRPr lang="en-US" dirty="0"/>
           </a:p>
@@ -5290,351 +5411,6 @@
           <a:chExt cx="0" cy="0"/>
         </a:xfrm>
       </p:grpSpPr>
-      <p:sp>
-        <p:nvSpPr>
-          <p:cNvPr id="3073" name="Text Box 1"/>
-          <p:cNvSpPr txBox="1">
-            <a:spLocks noChangeArrowheads="1"/>
-          </p:cNvSpPr>
-          <p:nvPr/>
-        </p:nvSpPr>
-        <p:spPr bwMode="auto">
-          <a:xfrm>
-            <a:off x="470119" y="1892691"/>
-            <a:ext cx="2592281" cy="1716148"/>
-          </a:xfrm>
-          <a:prstGeom prst="rect">
-            <a:avLst/>
-          </a:prstGeom>
-          <a:noFill/>
-          <a:ln>
-            <a:noFill/>
-          </a:ln>
-          <a:effectLst/>
-          <a:extLst>
-            <a:ext uri="{909E8E84-426E-40dd-AFC4-6F175D3DCCD1}">
-              <a14:hiddenFill xmlns:a14="http://schemas.microsoft.com/office/drawing/2010/main">
-                <a:solidFill>
-                  <a:srgbClr val="FFFFFF"/>
-                </a:solidFill>
-              </a14:hiddenFill>
-            </a:ext>
-            <a:ext uri="{91240B29-F687-4f45-9708-019B960494DF}">
-              <a14:hiddenLine xmlns:a14="http://schemas.microsoft.com/office/drawing/2010/main" w="9525">
-                <a:solidFill>
-                  <a:srgbClr val="FFFFFF"/>
-                </a:solidFill>
-                <a:round/>
-                <a:headEnd/>
-                <a:tailEnd/>
-              </a14:hiddenLine>
-            </a:ext>
-            <a:ext uri="{AF507438-7753-43e0-B8FC-AC1667EBCBE1}">
-              <a14:hiddenEffects xmlns:a14="http://schemas.microsoft.com/office/drawing/2010/main">
-                <a:effectLst>
-                  <a:outerShdw blurRad="63500" dist="38099" dir="2700000" algn="ctr" rotWithShape="0">
-                    <a:srgbClr val="000000">
-                      <a:alpha val="74998"/>
-                    </a:srgbClr>
-                  </a:outerShdw>
-                </a:effectLst>
-              </a14:hiddenEffects>
-            </a:ext>
-          </a:extLst>
-        </p:spPr>
-        <p:txBody>
-          <a:bodyPr lIns="0" tIns="0" rIns="0" bIns="0"/>
-          <a:lstStyle>
-            <a:lvl1pPr>
-              <a:tabLst>
-                <a:tab pos="723900" algn="l"/>
-                <a:tab pos="1447800" algn="l"/>
-                <a:tab pos="2171700" algn="l"/>
-                <a:tab pos="2895600" algn="l"/>
-                <a:tab pos="3619500" algn="l"/>
-                <a:tab pos="4343400" algn="l"/>
-                <a:tab pos="5067300" algn="l"/>
-                <a:tab pos="5791200" algn="l"/>
-                <a:tab pos="6515100" algn="l"/>
-                <a:tab pos="7239000" algn="l"/>
-                <a:tab pos="7962900" algn="l"/>
-                <a:tab pos="8686800" algn="l"/>
-              </a:tabLst>
-              <a:defRPr sz="2400">
-                <a:solidFill>
-                  <a:srgbClr val="000000"/>
-                </a:solidFill>
-                <a:latin typeface="Times New Roman" charset="0"/>
-                <a:ea typeface="ＭＳ Ｐゴシック" charset="0"/>
-                <a:cs typeface="msgothic" charset="0"/>
-              </a:defRPr>
-            </a:lvl1pPr>
-            <a:lvl2pPr>
-              <a:tabLst>
-                <a:tab pos="723900" algn="l"/>
-                <a:tab pos="1447800" algn="l"/>
-                <a:tab pos="2171700" algn="l"/>
-                <a:tab pos="2895600" algn="l"/>
-                <a:tab pos="3619500" algn="l"/>
-                <a:tab pos="4343400" algn="l"/>
-                <a:tab pos="5067300" algn="l"/>
-                <a:tab pos="5791200" algn="l"/>
-                <a:tab pos="6515100" algn="l"/>
-                <a:tab pos="7239000" algn="l"/>
-                <a:tab pos="7962900" algn="l"/>
-                <a:tab pos="8686800" algn="l"/>
-              </a:tabLst>
-              <a:defRPr sz="2400">
-                <a:solidFill>
-                  <a:srgbClr val="000000"/>
-                </a:solidFill>
-                <a:latin typeface="Times New Roman" charset="0"/>
-                <a:ea typeface="ＭＳ Ｐゴシック" charset="0"/>
-                <a:cs typeface="msgothic" charset="0"/>
-              </a:defRPr>
-            </a:lvl2pPr>
-            <a:lvl3pPr>
-              <a:tabLst>
-                <a:tab pos="723900" algn="l"/>
-                <a:tab pos="1447800" algn="l"/>
-                <a:tab pos="2171700" algn="l"/>
-                <a:tab pos="2895600" algn="l"/>
-                <a:tab pos="3619500" algn="l"/>
-                <a:tab pos="4343400" algn="l"/>
-                <a:tab pos="5067300" algn="l"/>
-                <a:tab pos="5791200" algn="l"/>
-                <a:tab pos="6515100" algn="l"/>
-                <a:tab pos="7239000" algn="l"/>
-                <a:tab pos="7962900" algn="l"/>
-                <a:tab pos="8686800" algn="l"/>
-              </a:tabLst>
-              <a:defRPr sz="2400">
-                <a:solidFill>
-                  <a:srgbClr val="000000"/>
-                </a:solidFill>
-                <a:latin typeface="Times New Roman" charset="0"/>
-                <a:ea typeface="ＭＳ Ｐゴシック" charset="0"/>
-                <a:cs typeface="msgothic" charset="0"/>
-              </a:defRPr>
-            </a:lvl3pPr>
-            <a:lvl4pPr>
-              <a:tabLst>
-                <a:tab pos="723900" algn="l"/>
-                <a:tab pos="1447800" algn="l"/>
-                <a:tab pos="2171700" algn="l"/>
-                <a:tab pos="2895600" algn="l"/>
-                <a:tab pos="3619500" algn="l"/>
-                <a:tab pos="4343400" algn="l"/>
-                <a:tab pos="5067300" algn="l"/>
-                <a:tab pos="5791200" algn="l"/>
-                <a:tab pos="6515100" algn="l"/>
-                <a:tab pos="7239000" algn="l"/>
-                <a:tab pos="7962900" algn="l"/>
-                <a:tab pos="8686800" algn="l"/>
-              </a:tabLst>
-              <a:defRPr sz="2400">
-                <a:solidFill>
-                  <a:srgbClr val="000000"/>
-                </a:solidFill>
-                <a:latin typeface="Times New Roman" charset="0"/>
-                <a:ea typeface="ＭＳ Ｐゴシック" charset="0"/>
-                <a:cs typeface="msgothic" charset="0"/>
-              </a:defRPr>
-            </a:lvl4pPr>
-            <a:lvl5pPr>
-              <a:tabLst>
-                <a:tab pos="723900" algn="l"/>
-                <a:tab pos="1447800" algn="l"/>
-                <a:tab pos="2171700" algn="l"/>
-                <a:tab pos="2895600" algn="l"/>
-                <a:tab pos="3619500" algn="l"/>
-                <a:tab pos="4343400" algn="l"/>
-                <a:tab pos="5067300" algn="l"/>
-                <a:tab pos="5791200" algn="l"/>
-                <a:tab pos="6515100" algn="l"/>
-                <a:tab pos="7239000" algn="l"/>
-                <a:tab pos="7962900" algn="l"/>
-                <a:tab pos="8686800" algn="l"/>
-              </a:tabLst>
-              <a:defRPr sz="2400">
-                <a:solidFill>
-                  <a:srgbClr val="000000"/>
-                </a:solidFill>
-                <a:latin typeface="Times New Roman" charset="0"/>
-                <a:ea typeface="ＭＳ Ｐゴシック" charset="0"/>
-                <a:cs typeface="msgothic" charset="0"/>
-              </a:defRPr>
-            </a:lvl5pPr>
-            <a:lvl6pPr marL="1536700" indent="-215900" fontAlgn="base" hangingPunct="0">
-              <a:lnSpc>
-                <a:spcPct val="93000"/>
-              </a:lnSpc>
-              <a:spcBef>
-                <a:spcPct val="0"/>
-              </a:spcBef>
-              <a:spcAft>
-                <a:spcPct val="0"/>
-              </a:spcAft>
-              <a:buClr>
-                <a:srgbClr val="000000"/>
-              </a:buClr>
-              <a:buSzPct val="45000"/>
-              <a:buFont typeface="Wingdings" charset="0"/>
-              <a:tabLst>
-                <a:tab pos="723900" algn="l"/>
-                <a:tab pos="1447800" algn="l"/>
-                <a:tab pos="2171700" algn="l"/>
-                <a:tab pos="2895600" algn="l"/>
-                <a:tab pos="3619500" algn="l"/>
-                <a:tab pos="4343400" algn="l"/>
-                <a:tab pos="5067300" algn="l"/>
-                <a:tab pos="5791200" algn="l"/>
-                <a:tab pos="6515100" algn="l"/>
-                <a:tab pos="7239000" algn="l"/>
-                <a:tab pos="7962900" algn="l"/>
-                <a:tab pos="8686800" algn="l"/>
-              </a:tabLst>
-              <a:defRPr sz="2400">
-                <a:solidFill>
-                  <a:srgbClr val="000000"/>
-                </a:solidFill>
-                <a:latin typeface="Times New Roman" charset="0"/>
-                <a:ea typeface="ＭＳ Ｐゴシック" charset="0"/>
-                <a:cs typeface="msgothic" charset="0"/>
-              </a:defRPr>
-            </a:lvl6pPr>
-            <a:lvl7pPr marL="1993900" indent="-215900" fontAlgn="base" hangingPunct="0">
-              <a:lnSpc>
-                <a:spcPct val="93000"/>
-              </a:lnSpc>
-              <a:spcBef>
-                <a:spcPct val="0"/>
-              </a:spcBef>
-              <a:spcAft>
-                <a:spcPct val="0"/>
-              </a:spcAft>
-              <a:buClr>
-                <a:srgbClr val="000000"/>
-              </a:buClr>
-              <a:buSzPct val="45000"/>
-              <a:buFont typeface="Wingdings" charset="0"/>
-              <a:tabLst>
-                <a:tab pos="723900" algn="l"/>
-                <a:tab pos="1447800" algn="l"/>
-                <a:tab pos="2171700" algn="l"/>
-                <a:tab pos="2895600" algn="l"/>
-                <a:tab pos="3619500" algn="l"/>
-                <a:tab pos="4343400" algn="l"/>
-                <a:tab pos="5067300" algn="l"/>
-                <a:tab pos="5791200" algn="l"/>
-                <a:tab pos="6515100" algn="l"/>
-                <a:tab pos="7239000" algn="l"/>
-                <a:tab pos="7962900" algn="l"/>
-                <a:tab pos="8686800" algn="l"/>
-              </a:tabLst>
-              <a:defRPr sz="2400">
-                <a:solidFill>
-                  <a:srgbClr val="000000"/>
-                </a:solidFill>
-                <a:latin typeface="Times New Roman" charset="0"/>
-                <a:ea typeface="ＭＳ Ｐゴシック" charset="0"/>
-                <a:cs typeface="msgothic" charset="0"/>
-              </a:defRPr>
-            </a:lvl7pPr>
-            <a:lvl8pPr marL="2451100" indent="-215900" fontAlgn="base" hangingPunct="0">
-              <a:lnSpc>
-                <a:spcPct val="93000"/>
-              </a:lnSpc>
-              <a:spcBef>
-                <a:spcPct val="0"/>
-              </a:spcBef>
-              <a:spcAft>
-                <a:spcPct val="0"/>
-              </a:spcAft>
-              <a:buClr>
-                <a:srgbClr val="000000"/>
-              </a:buClr>
-              <a:buSzPct val="45000"/>
-              <a:buFont typeface="Wingdings" charset="0"/>
-              <a:tabLst>
-                <a:tab pos="723900" algn="l"/>
-                <a:tab pos="1447800" algn="l"/>
-                <a:tab pos="2171700" algn="l"/>
-                <a:tab pos="2895600" algn="l"/>
-                <a:tab pos="3619500" algn="l"/>
-                <a:tab pos="4343400" algn="l"/>
-                <a:tab pos="5067300" algn="l"/>
-                <a:tab pos="5791200" algn="l"/>
-                <a:tab pos="6515100" algn="l"/>
-                <a:tab pos="7239000" algn="l"/>
-                <a:tab pos="7962900" algn="l"/>
-                <a:tab pos="8686800" algn="l"/>
-              </a:tabLst>
-              <a:defRPr sz="2400">
-                <a:solidFill>
-                  <a:srgbClr val="000000"/>
-                </a:solidFill>
-                <a:latin typeface="Times New Roman" charset="0"/>
-                <a:ea typeface="ＭＳ Ｐゴシック" charset="0"/>
-                <a:cs typeface="msgothic" charset="0"/>
-              </a:defRPr>
-            </a:lvl8pPr>
-            <a:lvl9pPr marL="2908300" indent="-215900" fontAlgn="base" hangingPunct="0">
-              <a:lnSpc>
-                <a:spcPct val="93000"/>
-              </a:lnSpc>
-              <a:spcBef>
-                <a:spcPct val="0"/>
-              </a:spcBef>
-              <a:spcAft>
-                <a:spcPct val="0"/>
-              </a:spcAft>
-              <a:buClr>
-                <a:srgbClr val="000000"/>
-              </a:buClr>
-              <a:buSzPct val="45000"/>
-              <a:buFont typeface="Wingdings" charset="0"/>
-              <a:tabLst>
-                <a:tab pos="723900" algn="l"/>
-                <a:tab pos="1447800" algn="l"/>
-                <a:tab pos="2171700" algn="l"/>
-                <a:tab pos="2895600" algn="l"/>
-                <a:tab pos="3619500" algn="l"/>
-                <a:tab pos="4343400" algn="l"/>
-                <a:tab pos="5067300" algn="l"/>
-                <a:tab pos="5791200" algn="l"/>
-                <a:tab pos="6515100" algn="l"/>
-                <a:tab pos="7239000" algn="l"/>
-                <a:tab pos="7962900" algn="l"/>
-                <a:tab pos="8686800" algn="l"/>
-              </a:tabLst>
-              <a:defRPr sz="2400">
-                <a:solidFill>
-                  <a:srgbClr val="000000"/>
-                </a:solidFill>
-                <a:latin typeface="Times New Roman" charset="0"/>
-                <a:ea typeface="ＭＳ Ｐゴシック" charset="0"/>
-                <a:cs typeface="msgothic" charset="0"/>
-              </a:defRPr>
-            </a:lvl9pPr>
-          </a:lstStyle>
-          <a:p>
-            <a:pPr algn="ctr"/>
-            <a:r>
-              <a:rPr lang="en-GB" sz="1500" b="1" dirty="0" smtClean="0">
-                <a:latin typeface="Arial" charset="0"/>
-              </a:rPr>
-              <a:t>Number </a:t>
-            </a:r>
-            <a:r>
-              <a:rPr lang="en-GB" sz="1500" b="1" dirty="0">
-                <a:latin typeface="Arial" charset="0"/>
-              </a:rPr>
-              <a:t>of somatic mutations in representative human cancers, detected by genome-wide sequencing studies. </a:t>
-            </a:r>
-          </a:p>
-        </p:txBody>
-      </p:sp>
       <p:pic>
         <p:nvPicPr>
           <p:cNvPr id="3074" name="Picture 2"/>
@@ -5713,7 +5489,7 @@
           </p:cNvPicPr>
           <p:nvPr/>
         </p:nvPicPr>
-        <p:blipFill>
+        <p:blipFill rotWithShape="1">
           <a:blip r:embed="rId4">
             <a:extLst>
               <a:ext uri="{28A0092B-C50C-407E-A947-70E740481C1C}">
@@ -5721,15 +5497,13 @@
               </a:ext>
             </a:extLst>
           </a:blip>
-          <a:srcRect/>
-          <a:stretch>
-            <a:fillRect/>
-          </a:stretch>
+          <a:srcRect t="35387" b="1"/>
+          <a:stretch/>
         </p:blipFill>
         <p:spPr bwMode="auto">
           <a:xfrm>
-            <a:off x="3529439" y="54116"/>
-            <a:ext cx="4098431" cy="6744761"/>
+            <a:off x="649309" y="13090"/>
+            <a:ext cx="6437291" cy="6844909"/>
           </a:xfrm>
           <a:prstGeom prst="rect">
             <a:avLst/>
@@ -5775,281 +5549,6 @@
           </a:extLst>
         </p:spPr>
       </p:pic>
-      <p:sp>
-        <p:nvSpPr>
-          <p:cNvPr id="3076" name="Text Box 4"/>
-          <p:cNvSpPr txBox="1">
-            <a:spLocks noChangeArrowheads="1"/>
-          </p:cNvSpPr>
-          <p:nvPr/>
-        </p:nvSpPr>
-        <p:spPr bwMode="auto">
-          <a:xfrm>
-            <a:off x="470119" y="3376975"/>
-            <a:ext cx="2781077" cy="231864"/>
-          </a:xfrm>
-          <a:prstGeom prst="rect">
-            <a:avLst/>
-          </a:prstGeom>
-          <a:noFill/>
-          <a:ln>
-            <a:noFill/>
-          </a:ln>
-          <a:effectLst/>
-          <a:extLst>
-            <a:ext uri="{909E8E84-426E-40dd-AFC4-6F175D3DCCD1}">
-              <a14:hiddenFill xmlns:a14="http://schemas.microsoft.com/office/drawing/2010/main">
-                <a:solidFill>
-                  <a:srgbClr val="FFFFFF"/>
-                </a:solidFill>
-              </a14:hiddenFill>
-            </a:ext>
-            <a:ext uri="{91240B29-F687-4f45-9708-019B960494DF}">
-              <a14:hiddenLine xmlns:a14="http://schemas.microsoft.com/office/drawing/2010/main" w="9525">
-                <a:solidFill>
-                  <a:srgbClr val="FFFFFF"/>
-                </a:solidFill>
-                <a:round/>
-                <a:headEnd/>
-                <a:tailEnd/>
-              </a14:hiddenLine>
-            </a:ext>
-            <a:ext uri="{AF507438-7753-43e0-B8FC-AC1667EBCBE1}">
-              <a14:hiddenEffects xmlns:a14="http://schemas.microsoft.com/office/drawing/2010/main">
-                <a:effectLst>
-                  <a:outerShdw blurRad="63500" dist="38099" dir="2700000" algn="ctr" rotWithShape="0">
-                    <a:srgbClr val="000000">
-                      <a:alpha val="74998"/>
-                    </a:srgbClr>
-                  </a:outerShdw>
-                </a:effectLst>
-              </a14:hiddenEffects>
-            </a:ext>
-          </a:extLst>
-        </p:spPr>
-        <p:txBody>
-          <a:bodyPr lIns="0" tIns="0" rIns="0" bIns="0"/>
-          <a:lstStyle>
-            <a:lvl1pPr>
-              <a:tabLst>
-                <a:tab pos="723900" algn="l"/>
-                <a:tab pos="1447800" algn="l"/>
-                <a:tab pos="2171700" algn="l"/>
-                <a:tab pos="2895600" algn="l"/>
-                <a:tab pos="3619500" algn="l"/>
-              </a:tabLst>
-              <a:defRPr sz="2400">
-                <a:solidFill>
-                  <a:srgbClr val="000000"/>
-                </a:solidFill>
-                <a:latin typeface="Times New Roman" charset="0"/>
-                <a:ea typeface="ＭＳ Ｐゴシック" charset="0"/>
-                <a:cs typeface="msgothic" charset="0"/>
-              </a:defRPr>
-            </a:lvl1pPr>
-            <a:lvl2pPr>
-              <a:tabLst>
-                <a:tab pos="723900" algn="l"/>
-                <a:tab pos="1447800" algn="l"/>
-                <a:tab pos="2171700" algn="l"/>
-                <a:tab pos="2895600" algn="l"/>
-                <a:tab pos="3619500" algn="l"/>
-              </a:tabLst>
-              <a:defRPr sz="2400">
-                <a:solidFill>
-                  <a:srgbClr val="000000"/>
-                </a:solidFill>
-                <a:latin typeface="Times New Roman" charset="0"/>
-                <a:ea typeface="ＭＳ Ｐゴシック" charset="0"/>
-                <a:cs typeface="msgothic" charset="0"/>
-              </a:defRPr>
-            </a:lvl2pPr>
-            <a:lvl3pPr>
-              <a:tabLst>
-                <a:tab pos="723900" algn="l"/>
-                <a:tab pos="1447800" algn="l"/>
-                <a:tab pos="2171700" algn="l"/>
-                <a:tab pos="2895600" algn="l"/>
-                <a:tab pos="3619500" algn="l"/>
-              </a:tabLst>
-              <a:defRPr sz="2400">
-                <a:solidFill>
-                  <a:srgbClr val="000000"/>
-                </a:solidFill>
-                <a:latin typeface="Times New Roman" charset="0"/>
-                <a:ea typeface="ＭＳ Ｐゴシック" charset="0"/>
-                <a:cs typeface="msgothic" charset="0"/>
-              </a:defRPr>
-            </a:lvl3pPr>
-            <a:lvl4pPr>
-              <a:tabLst>
-                <a:tab pos="723900" algn="l"/>
-                <a:tab pos="1447800" algn="l"/>
-                <a:tab pos="2171700" algn="l"/>
-                <a:tab pos="2895600" algn="l"/>
-                <a:tab pos="3619500" algn="l"/>
-              </a:tabLst>
-              <a:defRPr sz="2400">
-                <a:solidFill>
-                  <a:srgbClr val="000000"/>
-                </a:solidFill>
-                <a:latin typeface="Times New Roman" charset="0"/>
-                <a:ea typeface="ＭＳ Ｐゴシック" charset="0"/>
-                <a:cs typeface="msgothic" charset="0"/>
-              </a:defRPr>
-            </a:lvl4pPr>
-            <a:lvl5pPr>
-              <a:tabLst>
-                <a:tab pos="723900" algn="l"/>
-                <a:tab pos="1447800" algn="l"/>
-                <a:tab pos="2171700" algn="l"/>
-                <a:tab pos="2895600" algn="l"/>
-                <a:tab pos="3619500" algn="l"/>
-              </a:tabLst>
-              <a:defRPr sz="2400">
-                <a:solidFill>
-                  <a:srgbClr val="000000"/>
-                </a:solidFill>
-                <a:latin typeface="Times New Roman" charset="0"/>
-                <a:ea typeface="ＭＳ Ｐゴシック" charset="0"/>
-                <a:cs typeface="msgothic" charset="0"/>
-              </a:defRPr>
-            </a:lvl5pPr>
-            <a:lvl6pPr marL="1536700" indent="-215900" fontAlgn="base" hangingPunct="0">
-              <a:lnSpc>
-                <a:spcPct val="93000"/>
-              </a:lnSpc>
-              <a:spcBef>
-                <a:spcPct val="0"/>
-              </a:spcBef>
-              <a:spcAft>
-                <a:spcPct val="0"/>
-              </a:spcAft>
-              <a:buClr>
-                <a:srgbClr val="000000"/>
-              </a:buClr>
-              <a:buSzPct val="45000"/>
-              <a:buFont typeface="Wingdings" charset="0"/>
-              <a:tabLst>
-                <a:tab pos="723900" algn="l"/>
-                <a:tab pos="1447800" algn="l"/>
-                <a:tab pos="2171700" algn="l"/>
-                <a:tab pos="2895600" algn="l"/>
-                <a:tab pos="3619500" algn="l"/>
-              </a:tabLst>
-              <a:defRPr sz="2400">
-                <a:solidFill>
-                  <a:srgbClr val="000000"/>
-                </a:solidFill>
-                <a:latin typeface="Times New Roman" charset="0"/>
-                <a:ea typeface="ＭＳ Ｐゴシック" charset="0"/>
-                <a:cs typeface="msgothic" charset="0"/>
-              </a:defRPr>
-            </a:lvl6pPr>
-            <a:lvl7pPr marL="1993900" indent="-215900" fontAlgn="base" hangingPunct="0">
-              <a:lnSpc>
-                <a:spcPct val="93000"/>
-              </a:lnSpc>
-              <a:spcBef>
-                <a:spcPct val="0"/>
-              </a:spcBef>
-              <a:spcAft>
-                <a:spcPct val="0"/>
-              </a:spcAft>
-              <a:buClr>
-                <a:srgbClr val="000000"/>
-              </a:buClr>
-              <a:buSzPct val="45000"/>
-              <a:buFont typeface="Wingdings" charset="0"/>
-              <a:tabLst>
-                <a:tab pos="723900" algn="l"/>
-                <a:tab pos="1447800" algn="l"/>
-                <a:tab pos="2171700" algn="l"/>
-                <a:tab pos="2895600" algn="l"/>
-                <a:tab pos="3619500" algn="l"/>
-              </a:tabLst>
-              <a:defRPr sz="2400">
-                <a:solidFill>
-                  <a:srgbClr val="000000"/>
-                </a:solidFill>
-                <a:latin typeface="Times New Roman" charset="0"/>
-                <a:ea typeface="ＭＳ Ｐゴシック" charset="0"/>
-                <a:cs typeface="msgothic" charset="0"/>
-              </a:defRPr>
-            </a:lvl7pPr>
-            <a:lvl8pPr marL="2451100" indent="-215900" fontAlgn="base" hangingPunct="0">
-              <a:lnSpc>
-                <a:spcPct val="93000"/>
-              </a:lnSpc>
-              <a:spcBef>
-                <a:spcPct val="0"/>
-              </a:spcBef>
-              <a:spcAft>
-                <a:spcPct val="0"/>
-              </a:spcAft>
-              <a:buClr>
-                <a:srgbClr val="000000"/>
-              </a:buClr>
-              <a:buSzPct val="45000"/>
-              <a:buFont typeface="Wingdings" charset="0"/>
-              <a:tabLst>
-                <a:tab pos="723900" algn="l"/>
-                <a:tab pos="1447800" algn="l"/>
-                <a:tab pos="2171700" algn="l"/>
-                <a:tab pos="2895600" algn="l"/>
-                <a:tab pos="3619500" algn="l"/>
-              </a:tabLst>
-              <a:defRPr sz="2400">
-                <a:solidFill>
-                  <a:srgbClr val="000000"/>
-                </a:solidFill>
-                <a:latin typeface="Times New Roman" charset="0"/>
-                <a:ea typeface="ＭＳ Ｐゴシック" charset="0"/>
-                <a:cs typeface="msgothic" charset="0"/>
-              </a:defRPr>
-            </a:lvl8pPr>
-            <a:lvl9pPr marL="2908300" indent="-215900" fontAlgn="base" hangingPunct="0">
-              <a:lnSpc>
-                <a:spcPct val="93000"/>
-              </a:lnSpc>
-              <a:spcBef>
-                <a:spcPct val="0"/>
-              </a:spcBef>
-              <a:spcAft>
-                <a:spcPct val="0"/>
-              </a:spcAft>
-              <a:buClr>
-                <a:srgbClr val="000000"/>
-              </a:buClr>
-              <a:buSzPct val="45000"/>
-              <a:buFont typeface="Wingdings" charset="0"/>
-              <a:tabLst>
-                <a:tab pos="723900" algn="l"/>
-                <a:tab pos="1447800" algn="l"/>
-                <a:tab pos="2171700" algn="l"/>
-                <a:tab pos="2895600" algn="l"/>
-                <a:tab pos="3619500" algn="l"/>
-              </a:tabLst>
-              <a:defRPr sz="2400">
-                <a:solidFill>
-                  <a:srgbClr val="000000"/>
-                </a:solidFill>
-                <a:latin typeface="Times New Roman" charset="0"/>
-                <a:ea typeface="ＭＳ Ｐゴシック" charset="0"/>
-                <a:cs typeface="msgothic" charset="0"/>
-              </a:defRPr>
-            </a:lvl9pPr>
-          </a:lstStyle>
-          <a:p>
-            <a:r>
-              <a:rPr lang="en-GB" sz="1100" b="1" dirty="0">
-                <a:latin typeface="Arial" charset="0"/>
-              </a:rPr>
-              <a:t>Bert Vogelstein et al. Science 2013;339:1546-1558</a:t>
-            </a:r>
-          </a:p>
-        </p:txBody>
-      </p:sp>
       <p:sp>
         <p:nvSpPr>
           <p:cNvPr id="3077" name="Text Box 5"/>
@@ -6340,6 +5839,391 @@
               </a:rPr>
               <a:t>Published by AAAS</a:t>
             </a:r>
+          </a:p>
+        </p:txBody>
+      </p:sp>
+      <p:sp>
+        <p:nvSpPr>
+          <p:cNvPr id="3073" name="Text Box 1"/>
+          <p:cNvSpPr txBox="1">
+            <a:spLocks noChangeArrowheads="1"/>
+          </p:cNvSpPr>
+          <p:nvPr/>
+        </p:nvSpPr>
+        <p:spPr bwMode="auto">
+          <a:xfrm>
+            <a:off x="2556934" y="13091"/>
+            <a:ext cx="6587066" cy="1781842"/>
+          </a:xfrm>
+          <a:prstGeom prst="rect">
+            <a:avLst/>
+          </a:prstGeom>
+          <a:solidFill>
+            <a:schemeClr val="bg1"/>
+          </a:solidFill>
+          <a:ln>
+            <a:solidFill>
+              <a:schemeClr val="accent6">
+                <a:lumMod val="50000"/>
+              </a:schemeClr>
+            </a:solidFill>
+          </a:ln>
+          <a:effectLst/>
+          <a:extLst/>
+        </p:spPr>
+        <p:txBody>
+          <a:bodyPr lIns="0" tIns="0" rIns="0" bIns="0"/>
+          <a:lstStyle>
+            <a:lvl1pPr>
+              <a:tabLst>
+                <a:tab pos="723900" algn="l"/>
+                <a:tab pos="1447800" algn="l"/>
+                <a:tab pos="2171700" algn="l"/>
+                <a:tab pos="2895600" algn="l"/>
+                <a:tab pos="3619500" algn="l"/>
+                <a:tab pos="4343400" algn="l"/>
+                <a:tab pos="5067300" algn="l"/>
+                <a:tab pos="5791200" algn="l"/>
+                <a:tab pos="6515100" algn="l"/>
+                <a:tab pos="7239000" algn="l"/>
+                <a:tab pos="7962900" algn="l"/>
+                <a:tab pos="8686800" algn="l"/>
+              </a:tabLst>
+              <a:defRPr sz="2400">
+                <a:solidFill>
+                  <a:srgbClr val="000000"/>
+                </a:solidFill>
+                <a:latin typeface="Times New Roman" charset="0"/>
+                <a:ea typeface="ＭＳ Ｐゴシック" charset="0"/>
+                <a:cs typeface="msgothic" charset="0"/>
+              </a:defRPr>
+            </a:lvl1pPr>
+            <a:lvl2pPr>
+              <a:tabLst>
+                <a:tab pos="723900" algn="l"/>
+                <a:tab pos="1447800" algn="l"/>
+                <a:tab pos="2171700" algn="l"/>
+                <a:tab pos="2895600" algn="l"/>
+                <a:tab pos="3619500" algn="l"/>
+                <a:tab pos="4343400" algn="l"/>
+                <a:tab pos="5067300" algn="l"/>
+                <a:tab pos="5791200" algn="l"/>
+                <a:tab pos="6515100" algn="l"/>
+                <a:tab pos="7239000" algn="l"/>
+                <a:tab pos="7962900" algn="l"/>
+                <a:tab pos="8686800" algn="l"/>
+              </a:tabLst>
+              <a:defRPr sz="2400">
+                <a:solidFill>
+                  <a:srgbClr val="000000"/>
+                </a:solidFill>
+                <a:latin typeface="Times New Roman" charset="0"/>
+                <a:ea typeface="ＭＳ Ｐゴシック" charset="0"/>
+                <a:cs typeface="msgothic" charset="0"/>
+              </a:defRPr>
+            </a:lvl2pPr>
+            <a:lvl3pPr>
+              <a:tabLst>
+                <a:tab pos="723900" algn="l"/>
+                <a:tab pos="1447800" algn="l"/>
+                <a:tab pos="2171700" algn="l"/>
+                <a:tab pos="2895600" algn="l"/>
+                <a:tab pos="3619500" algn="l"/>
+                <a:tab pos="4343400" algn="l"/>
+                <a:tab pos="5067300" algn="l"/>
+                <a:tab pos="5791200" algn="l"/>
+                <a:tab pos="6515100" algn="l"/>
+                <a:tab pos="7239000" algn="l"/>
+                <a:tab pos="7962900" algn="l"/>
+                <a:tab pos="8686800" algn="l"/>
+              </a:tabLst>
+              <a:defRPr sz="2400">
+                <a:solidFill>
+                  <a:srgbClr val="000000"/>
+                </a:solidFill>
+                <a:latin typeface="Times New Roman" charset="0"/>
+                <a:ea typeface="ＭＳ Ｐゴシック" charset="0"/>
+                <a:cs typeface="msgothic" charset="0"/>
+              </a:defRPr>
+            </a:lvl3pPr>
+            <a:lvl4pPr>
+              <a:tabLst>
+                <a:tab pos="723900" algn="l"/>
+                <a:tab pos="1447800" algn="l"/>
+                <a:tab pos="2171700" algn="l"/>
+                <a:tab pos="2895600" algn="l"/>
+                <a:tab pos="3619500" algn="l"/>
+                <a:tab pos="4343400" algn="l"/>
+                <a:tab pos="5067300" algn="l"/>
+                <a:tab pos="5791200" algn="l"/>
+                <a:tab pos="6515100" algn="l"/>
+                <a:tab pos="7239000" algn="l"/>
+                <a:tab pos="7962900" algn="l"/>
+                <a:tab pos="8686800" algn="l"/>
+              </a:tabLst>
+              <a:defRPr sz="2400">
+                <a:solidFill>
+                  <a:srgbClr val="000000"/>
+                </a:solidFill>
+                <a:latin typeface="Times New Roman" charset="0"/>
+                <a:ea typeface="ＭＳ Ｐゴシック" charset="0"/>
+                <a:cs typeface="msgothic" charset="0"/>
+              </a:defRPr>
+            </a:lvl4pPr>
+            <a:lvl5pPr>
+              <a:tabLst>
+                <a:tab pos="723900" algn="l"/>
+                <a:tab pos="1447800" algn="l"/>
+                <a:tab pos="2171700" algn="l"/>
+                <a:tab pos="2895600" algn="l"/>
+                <a:tab pos="3619500" algn="l"/>
+                <a:tab pos="4343400" algn="l"/>
+                <a:tab pos="5067300" algn="l"/>
+                <a:tab pos="5791200" algn="l"/>
+                <a:tab pos="6515100" algn="l"/>
+                <a:tab pos="7239000" algn="l"/>
+                <a:tab pos="7962900" algn="l"/>
+                <a:tab pos="8686800" algn="l"/>
+              </a:tabLst>
+              <a:defRPr sz="2400">
+                <a:solidFill>
+                  <a:srgbClr val="000000"/>
+                </a:solidFill>
+                <a:latin typeface="Times New Roman" charset="0"/>
+                <a:ea typeface="ＭＳ Ｐゴシック" charset="0"/>
+                <a:cs typeface="msgothic" charset="0"/>
+              </a:defRPr>
+            </a:lvl5pPr>
+            <a:lvl6pPr marL="1536700" indent="-215900" fontAlgn="base" hangingPunct="0">
+              <a:lnSpc>
+                <a:spcPct val="93000"/>
+              </a:lnSpc>
+              <a:spcBef>
+                <a:spcPct val="0"/>
+              </a:spcBef>
+              <a:spcAft>
+                <a:spcPct val="0"/>
+              </a:spcAft>
+              <a:buClr>
+                <a:srgbClr val="000000"/>
+              </a:buClr>
+              <a:buSzPct val="45000"/>
+              <a:buFont typeface="Wingdings" charset="0"/>
+              <a:tabLst>
+                <a:tab pos="723900" algn="l"/>
+                <a:tab pos="1447800" algn="l"/>
+                <a:tab pos="2171700" algn="l"/>
+                <a:tab pos="2895600" algn="l"/>
+                <a:tab pos="3619500" algn="l"/>
+                <a:tab pos="4343400" algn="l"/>
+                <a:tab pos="5067300" algn="l"/>
+                <a:tab pos="5791200" algn="l"/>
+                <a:tab pos="6515100" algn="l"/>
+                <a:tab pos="7239000" algn="l"/>
+                <a:tab pos="7962900" algn="l"/>
+                <a:tab pos="8686800" algn="l"/>
+              </a:tabLst>
+              <a:defRPr sz="2400">
+                <a:solidFill>
+                  <a:srgbClr val="000000"/>
+                </a:solidFill>
+                <a:latin typeface="Times New Roman" charset="0"/>
+                <a:ea typeface="ＭＳ Ｐゴシック" charset="0"/>
+                <a:cs typeface="msgothic" charset="0"/>
+              </a:defRPr>
+            </a:lvl6pPr>
+            <a:lvl7pPr marL="1993900" indent="-215900" fontAlgn="base" hangingPunct="0">
+              <a:lnSpc>
+                <a:spcPct val="93000"/>
+              </a:lnSpc>
+              <a:spcBef>
+                <a:spcPct val="0"/>
+              </a:spcBef>
+              <a:spcAft>
+                <a:spcPct val="0"/>
+              </a:spcAft>
+              <a:buClr>
+                <a:srgbClr val="000000"/>
+              </a:buClr>
+              <a:buSzPct val="45000"/>
+              <a:buFont typeface="Wingdings" charset="0"/>
+              <a:tabLst>
+                <a:tab pos="723900" algn="l"/>
+                <a:tab pos="1447800" algn="l"/>
+                <a:tab pos="2171700" algn="l"/>
+                <a:tab pos="2895600" algn="l"/>
+                <a:tab pos="3619500" algn="l"/>
+                <a:tab pos="4343400" algn="l"/>
+                <a:tab pos="5067300" algn="l"/>
+                <a:tab pos="5791200" algn="l"/>
+                <a:tab pos="6515100" algn="l"/>
+                <a:tab pos="7239000" algn="l"/>
+                <a:tab pos="7962900" algn="l"/>
+                <a:tab pos="8686800" algn="l"/>
+              </a:tabLst>
+              <a:defRPr sz="2400">
+                <a:solidFill>
+                  <a:srgbClr val="000000"/>
+                </a:solidFill>
+                <a:latin typeface="Times New Roman" charset="0"/>
+                <a:ea typeface="ＭＳ Ｐゴシック" charset="0"/>
+                <a:cs typeface="msgothic" charset="0"/>
+              </a:defRPr>
+            </a:lvl7pPr>
+            <a:lvl8pPr marL="2451100" indent="-215900" fontAlgn="base" hangingPunct="0">
+              <a:lnSpc>
+                <a:spcPct val="93000"/>
+              </a:lnSpc>
+              <a:spcBef>
+                <a:spcPct val="0"/>
+              </a:spcBef>
+              <a:spcAft>
+                <a:spcPct val="0"/>
+              </a:spcAft>
+              <a:buClr>
+                <a:srgbClr val="000000"/>
+              </a:buClr>
+              <a:buSzPct val="45000"/>
+              <a:buFont typeface="Wingdings" charset="0"/>
+              <a:tabLst>
+                <a:tab pos="723900" algn="l"/>
+                <a:tab pos="1447800" algn="l"/>
+                <a:tab pos="2171700" algn="l"/>
+                <a:tab pos="2895600" algn="l"/>
+                <a:tab pos="3619500" algn="l"/>
+                <a:tab pos="4343400" algn="l"/>
+                <a:tab pos="5067300" algn="l"/>
+                <a:tab pos="5791200" algn="l"/>
+                <a:tab pos="6515100" algn="l"/>
+                <a:tab pos="7239000" algn="l"/>
+                <a:tab pos="7962900" algn="l"/>
+                <a:tab pos="8686800" algn="l"/>
+              </a:tabLst>
+              <a:defRPr sz="2400">
+                <a:solidFill>
+                  <a:srgbClr val="000000"/>
+                </a:solidFill>
+                <a:latin typeface="Times New Roman" charset="0"/>
+                <a:ea typeface="ＭＳ Ｐゴシック" charset="0"/>
+                <a:cs typeface="msgothic" charset="0"/>
+              </a:defRPr>
+            </a:lvl8pPr>
+            <a:lvl9pPr marL="2908300" indent="-215900" fontAlgn="base" hangingPunct="0">
+              <a:lnSpc>
+                <a:spcPct val="93000"/>
+              </a:lnSpc>
+              <a:spcBef>
+                <a:spcPct val="0"/>
+              </a:spcBef>
+              <a:spcAft>
+                <a:spcPct val="0"/>
+              </a:spcAft>
+              <a:buClr>
+                <a:srgbClr val="000000"/>
+              </a:buClr>
+              <a:buSzPct val="45000"/>
+              <a:buFont typeface="Wingdings" charset="0"/>
+              <a:tabLst>
+                <a:tab pos="723900" algn="l"/>
+                <a:tab pos="1447800" algn="l"/>
+                <a:tab pos="2171700" algn="l"/>
+                <a:tab pos="2895600" algn="l"/>
+                <a:tab pos="3619500" algn="l"/>
+                <a:tab pos="4343400" algn="l"/>
+                <a:tab pos="5067300" algn="l"/>
+                <a:tab pos="5791200" algn="l"/>
+                <a:tab pos="6515100" algn="l"/>
+                <a:tab pos="7239000" algn="l"/>
+                <a:tab pos="7962900" algn="l"/>
+                <a:tab pos="8686800" algn="l"/>
+              </a:tabLst>
+              <a:defRPr sz="2400">
+                <a:solidFill>
+                  <a:srgbClr val="000000"/>
+                </a:solidFill>
+                <a:latin typeface="Times New Roman" charset="0"/>
+                <a:ea typeface="ＭＳ Ｐゴシック" charset="0"/>
+                <a:cs typeface="msgothic" charset="0"/>
+              </a:defRPr>
+            </a:lvl9pPr>
+          </a:lstStyle>
+          <a:p>
+            <a:pPr algn="ctr"/>
+            <a:endParaRPr lang="en-GB" sz="1800" b="1" dirty="0" smtClean="0">
+              <a:latin typeface="Arial" charset="0"/>
+            </a:endParaRPr>
+          </a:p>
+          <a:p>
+            <a:pPr algn="ctr"/>
+            <a:r>
+              <a:rPr lang="en-GB" sz="1800" b="1" dirty="0" smtClean="0">
+                <a:latin typeface="Arial" charset="0"/>
+              </a:rPr>
+              <a:t>Number </a:t>
+            </a:r>
+            <a:r>
+              <a:rPr lang="en-GB" sz="1800" b="1" dirty="0">
+                <a:latin typeface="Arial" charset="0"/>
+              </a:rPr>
+              <a:t>of </a:t>
+            </a:r>
+            <a:r>
+              <a:rPr lang="en-GB" sz="1800" b="1" dirty="0" smtClean="0">
+                <a:latin typeface="Arial" charset="0"/>
+              </a:rPr>
+              <a:t>non-synonymous somatic </a:t>
+            </a:r>
+            <a:r>
+              <a:rPr lang="en-GB" sz="1800" b="1" dirty="0">
+                <a:latin typeface="Arial" charset="0"/>
+              </a:rPr>
+              <a:t>mutations in representative human cancers, detected by genome-wide sequencing studies</a:t>
+            </a:r>
+            <a:r>
+              <a:rPr lang="en-GB" sz="1800" b="1" dirty="0" smtClean="0">
+                <a:latin typeface="Arial" charset="0"/>
+              </a:rPr>
+              <a:t>.</a:t>
+            </a:r>
+          </a:p>
+          <a:p>
+            <a:pPr algn="ctr"/>
+            <a:endParaRPr lang="en-GB" sz="1800" b="1" dirty="0" smtClean="0">
+              <a:latin typeface="Arial" charset="0"/>
+            </a:endParaRPr>
+          </a:p>
+          <a:p>
+            <a:pPr algn="ctr"/>
+            <a:r>
+              <a:rPr lang="en-GB" sz="1400" b="1" dirty="0">
+                <a:latin typeface="Arial" charset="0"/>
+              </a:rPr>
+              <a:t>Bert Vogelstein et al. Science 2013;339:1546-</a:t>
+            </a:r>
+            <a:r>
+              <a:rPr lang="en-GB" sz="1400" b="1" dirty="0" smtClean="0">
+                <a:latin typeface="Arial" charset="0"/>
+              </a:rPr>
+              <a:t>1558</a:t>
+            </a:r>
+          </a:p>
+          <a:p>
+            <a:pPr algn="ctr"/>
+            <a:endParaRPr lang="en-GB" sz="1400" b="1" dirty="0">
+              <a:latin typeface="Arial" charset="0"/>
+            </a:endParaRPr>
+          </a:p>
+          <a:p>
+            <a:pPr algn="ctr"/>
+            <a:r>
+              <a:rPr lang="en-GB" sz="1500" b="1" dirty="0" smtClean="0">
+                <a:latin typeface="Arial" charset="0"/>
+              </a:rPr>
+              <a:t> </a:t>
+            </a:r>
+            <a:endParaRPr lang="en-GB" sz="1500" b="1" dirty="0">
+              <a:latin typeface="Arial" charset="0"/>
+            </a:endParaRPr>
           </a:p>
         </p:txBody>
       </p:sp>
@@ -6653,13 +6537,18 @@
             </a:r>
             <a:r>
               <a:rPr lang="en-US" sz="1600" dirty="0" smtClean="0"/>
-              <a:t>driver mutations. In case of new </a:t>
-            </a:r>
+              <a:t>driver mutations. </a:t>
+            </a:r>
+            <a:endParaRPr lang="en-US" sz="1600" dirty="0" smtClean="0"/>
           </a:p>
           <a:p>
             <a:r>
               <a:rPr lang="en-US" sz="1600" dirty="0" smtClean="0"/>
-              <a:t>Columns: 100 primary breast cancer tumors (79 ER+, 21 ER-)</a:t>
+              <a:t>Columns</a:t>
+            </a:r>
+            <a:r>
+              <a:rPr lang="en-US" sz="1600" dirty="0" smtClean="0"/>
+              <a:t>: 100 primary breast cancer tumors (79 ER+, 21 ER-)</a:t>
             </a:r>
           </a:p>
           <a:p>
@@ -19336,16 +19225,10 @@
               <a:rPr lang="en-US" sz="3200" u="sng" dirty="0">
                 <a:hlinkClick r:id="rId2"/>
               </a:rPr>
-              <a:t>http://scilifelab.github.io/courses/ngsgu/cancergenomics</a:t>
-            </a:r>
-            <a:r>
-              <a:rPr lang="en-US" sz="3200" u="sng">
-                <a:hlinkClick r:id="rId2"/>
-              </a:rPr>
-              <a:t>/</a:t>
-            </a:r>
-            <a:r>
-              <a:rPr lang="en-US" sz="3200" u="sng" smtClean="0">
+              <a:t>http://scilifelab.github.io/courses/ngsgu/cancergenomics/</a:t>
+            </a:r>
+            <a:r>
+              <a:rPr lang="en-US" sz="3200" u="sng" dirty="0" smtClean="0">
                 <a:hlinkClick r:id="rId2"/>
               </a:rPr>
               <a:t>1710</a:t>
@@ -19697,6 +19580,156 @@
         </p:nvSpPr>
         <p:spPr/>
         <p:txBody>
+          <a:bodyPr>
+            <a:normAutofit fontScale="90000"/>
+          </a:bodyPr>
+          <a:lstStyle/>
+          <a:p>
+            <a:r>
+              <a:rPr lang="en-US" dirty="0"/>
+              <a:t>Driver and passenger mutations </a:t>
+            </a:r>
+            <a:r>
+              <a:rPr lang="en-US" dirty="0" smtClean="0"/>
+              <a:t/>
+            </a:r>
+            <a:br>
+              <a:rPr lang="en-US" dirty="0" smtClean="0"/>
+            </a:br>
+            <a:endParaRPr lang="en-US" dirty="0"/>
+          </a:p>
+        </p:txBody>
+      </p:sp>
+      <p:sp>
+        <p:nvSpPr>
+          <p:cNvPr id="3" name="Content Placeholder 2"/>
+          <p:cNvSpPr>
+            <a:spLocks noGrp="1"/>
+          </p:cNvSpPr>
+          <p:nvPr>
+            <p:ph idx="1"/>
+          </p:nvPr>
+        </p:nvSpPr>
+        <p:spPr>
+          <a:xfrm>
+            <a:off x="457200" y="1359075"/>
+            <a:ext cx="8229600" cy="4525963"/>
+          </a:xfrm>
+        </p:spPr>
+        <p:txBody>
+          <a:bodyPr>
+            <a:normAutofit/>
+          </a:bodyPr>
+          <a:lstStyle/>
+          <a:p>
+            <a:pPr marL="0" indent="0">
+              <a:buNone/>
+            </a:pPr>
+            <a:r>
+              <a:rPr lang="en-US" dirty="0">
+                <a:solidFill>
+                  <a:srgbClr val="FF0000"/>
+                </a:solidFill>
+              </a:rPr>
+              <a:t>Driver’ mutations </a:t>
+            </a:r>
+            <a:r>
+              <a:rPr lang="en-US" dirty="0"/>
+              <a:t>confer </a:t>
+            </a:r>
+            <a:r>
+              <a:rPr lang="en-US" dirty="0" smtClean="0"/>
+              <a:t>a growth advantage of the cell. They are positively </a:t>
+            </a:r>
+            <a:r>
+              <a:rPr lang="en-US" dirty="0"/>
+              <a:t>selected during the evolution of the </a:t>
+            </a:r>
+            <a:r>
+              <a:rPr lang="en-US" dirty="0" smtClean="0"/>
+              <a:t>cancer</a:t>
+            </a:r>
+          </a:p>
+          <a:p>
+            <a:pPr marL="0" indent="0">
+              <a:buNone/>
+            </a:pPr>
+            <a:endParaRPr lang="en-US" dirty="0" smtClean="0"/>
+          </a:p>
+          <a:p>
+            <a:pPr marL="0" indent="0">
+              <a:buNone/>
+            </a:pPr>
+            <a:r>
+              <a:rPr lang="en-US" dirty="0" smtClean="0">
+                <a:solidFill>
+                  <a:srgbClr val="FF0000"/>
+                </a:solidFill>
+              </a:rPr>
+              <a:t>Passenger mutations </a:t>
+            </a:r>
+            <a:r>
+              <a:rPr lang="en-US" dirty="0" smtClean="0"/>
+              <a:t>are neutral, they just happened to be present in an ancestor of the cancer cell</a:t>
+            </a:r>
+          </a:p>
+          <a:p>
+            <a:endParaRPr lang="en-US" dirty="0" smtClean="0"/>
+          </a:p>
+          <a:p>
+            <a:endParaRPr lang="en-US" dirty="0"/>
+          </a:p>
+        </p:txBody>
+      </p:sp>
+    </p:spTree>
+    <p:extLst>
+      <p:ext uri="{BB962C8B-B14F-4D97-AF65-F5344CB8AC3E}">
+        <p14:creationId xmlns:p14="http://schemas.microsoft.com/office/powerpoint/2010/main" val="2515317775"/>
+      </p:ext>
+    </p:extLst>
+  </p:cSld>
+  <p:clrMapOvr>
+    <a:masterClrMapping/>
+  </p:clrMapOvr>
+  <p:timing>
+    <p:tnLst>
+      <p:par>
+        <p:cTn xmlns:p14="http://schemas.microsoft.com/office/powerpoint/2010/main" id="1" dur="indefinite" restart="never" nodeType="tmRoot"/>
+      </p:par>
+    </p:tnLst>
+  </p:timing>
+</p:sld>
+</file>
+
+<file path=ppt/slides/slide7.xml><?xml version="1.0" encoding="utf-8"?>
+<p:sld xmlns:a="http://schemas.openxmlformats.org/drawingml/2006/main" xmlns:r="http://schemas.openxmlformats.org/officeDocument/2006/relationships" xmlns:p="http://schemas.openxmlformats.org/presentationml/2006/main" show="0">
+  <p:cSld>
+    <p:spTree>
+      <p:nvGrpSpPr>
+        <p:cNvPr id="1" name=""/>
+        <p:cNvGrpSpPr/>
+        <p:nvPr/>
+      </p:nvGrpSpPr>
+      <p:grpSpPr>
+        <a:xfrm>
+          <a:off x="0" y="0"/>
+          <a:ext cx="0" cy="0"/>
+          <a:chOff x="0" y="0"/>
+          <a:chExt cx="0" cy="0"/>
+        </a:xfrm>
+      </p:grpSpPr>
+      <p:sp>
+        <p:nvSpPr>
+          <p:cNvPr id="2" name="Title 1"/>
+          <p:cNvSpPr>
+            <a:spLocks noGrp="1"/>
+          </p:cNvSpPr>
+          <p:nvPr>
+            <p:ph type="title"/>
+          </p:nvPr>
+        </p:nvSpPr>
+        <p:spPr/>
+        <p:txBody>
           <a:bodyPr/>
           <a:lstStyle/>
           <a:p>
@@ -19790,156 +19823,14 @@
   <p:clrMapOvr>
     <a:masterClrMapping/>
   </p:clrMapOvr>
-  <p:timing>
-    <p:tnLst>
-      <p:par>
-        <p:cTn xmlns:p14="http://schemas.microsoft.com/office/powerpoint/2010/main" id="1" dur="indefinite" restart="never" nodeType="tmRoot"/>
-      </p:par>
-    </p:tnLst>
-  </p:timing>
-</p:sld>
-</file>
-
-<file path=ppt/slides/slide7.xml><?xml version="1.0" encoding="utf-8"?>
-<p:sld xmlns:a="http://schemas.openxmlformats.org/drawingml/2006/main" xmlns:r="http://schemas.openxmlformats.org/officeDocument/2006/relationships" xmlns:p="http://schemas.openxmlformats.org/presentationml/2006/main">
-  <p:cSld>
-    <p:spTree>
-      <p:nvGrpSpPr>
-        <p:cNvPr id="1" name=""/>
-        <p:cNvGrpSpPr/>
-        <p:nvPr/>
-      </p:nvGrpSpPr>
-      <p:grpSpPr>
-        <a:xfrm>
-          <a:off x="0" y="0"/>
-          <a:ext cx="0" cy="0"/>
-          <a:chOff x="0" y="0"/>
-          <a:chExt cx="0" cy="0"/>
-        </a:xfrm>
-      </p:grpSpPr>
-      <p:sp>
-        <p:nvSpPr>
-          <p:cNvPr id="2" name="Title 1"/>
-          <p:cNvSpPr>
-            <a:spLocks noGrp="1"/>
-          </p:cNvSpPr>
-          <p:nvPr>
-            <p:ph type="title"/>
-          </p:nvPr>
-        </p:nvSpPr>
-        <p:spPr/>
-        <p:txBody>
-          <a:bodyPr>
-            <a:normAutofit fontScale="90000"/>
-          </a:bodyPr>
-          <a:lstStyle/>
-          <a:p>
-            <a:r>
-              <a:rPr lang="en-US" dirty="0"/>
-              <a:t>Driver and passenger mutations </a:t>
-            </a:r>
-            <a:r>
-              <a:rPr lang="en-US" dirty="0" smtClean="0"/>
-              <a:t/>
-            </a:r>
-            <a:br>
-              <a:rPr lang="en-US" dirty="0" smtClean="0"/>
-            </a:br>
-            <a:endParaRPr lang="en-US" dirty="0"/>
-          </a:p>
-        </p:txBody>
-      </p:sp>
-      <p:sp>
-        <p:nvSpPr>
-          <p:cNvPr id="3" name="Content Placeholder 2"/>
-          <p:cNvSpPr>
-            <a:spLocks noGrp="1"/>
-          </p:cNvSpPr>
-          <p:nvPr>
-            <p:ph idx="1"/>
-          </p:nvPr>
-        </p:nvSpPr>
-        <p:spPr>
-          <a:xfrm>
-            <a:off x="457200" y="1359075"/>
-            <a:ext cx="8229600" cy="4525963"/>
-          </a:xfrm>
-        </p:spPr>
-        <p:txBody>
-          <a:bodyPr>
-            <a:normAutofit/>
-          </a:bodyPr>
-          <a:lstStyle/>
-          <a:p>
-            <a:pPr marL="0" indent="0">
-              <a:buNone/>
-            </a:pPr>
-            <a:r>
-              <a:rPr lang="en-US" dirty="0">
-                <a:solidFill>
-                  <a:srgbClr val="FF0000"/>
-                </a:solidFill>
-              </a:rPr>
-              <a:t>Driver’ mutations </a:t>
-            </a:r>
-            <a:r>
-              <a:rPr lang="en-US" dirty="0"/>
-              <a:t>confer </a:t>
-            </a:r>
-            <a:r>
-              <a:rPr lang="en-US" dirty="0" smtClean="0"/>
-              <a:t>a growth advantage of the cell. They are positively </a:t>
-            </a:r>
-            <a:r>
-              <a:rPr lang="en-US" dirty="0"/>
-              <a:t>selected during the evolution of the </a:t>
-            </a:r>
-            <a:r>
-              <a:rPr lang="en-US" dirty="0" smtClean="0"/>
-              <a:t>cancer</a:t>
-            </a:r>
-          </a:p>
-          <a:p>
-            <a:pPr marL="0" indent="0">
-              <a:buNone/>
-            </a:pPr>
-            <a:endParaRPr lang="en-US" dirty="0" smtClean="0"/>
-          </a:p>
-          <a:p>
-            <a:pPr marL="0" indent="0">
-              <a:buNone/>
-            </a:pPr>
-            <a:r>
-              <a:rPr lang="en-US" dirty="0" smtClean="0">
-                <a:solidFill>
-                  <a:srgbClr val="FF0000"/>
-                </a:solidFill>
-              </a:rPr>
-              <a:t>Passenger mutations </a:t>
-            </a:r>
-            <a:r>
-              <a:rPr lang="en-US" dirty="0" smtClean="0"/>
-              <a:t>are neutral, they just happened to be present in an ancestor of the cancer cell</a:t>
-            </a:r>
-          </a:p>
-          <a:p>
-            <a:endParaRPr lang="en-US" dirty="0" smtClean="0"/>
-          </a:p>
-          <a:p>
-            <a:endParaRPr lang="en-US" dirty="0"/>
-          </a:p>
-        </p:txBody>
-      </p:sp>
-    </p:spTree>
-    <p:extLst>
-      <p:ext uri="{BB962C8B-B14F-4D97-AF65-F5344CB8AC3E}">
-        <p14:creationId xmlns:p14="http://schemas.microsoft.com/office/powerpoint/2010/main" val="2515317775"/>
-      </p:ext>
-    </p:extLst>
-  </p:cSld>
-  <p:clrMapOvr>
-    <a:masterClrMapping/>
-  </p:clrMapOvr>
+  <mc:AlternateContent xmlns:mc="http://schemas.openxmlformats.org/markup-compatibility/2006">
+    <mc:Choice xmlns:p14="http://schemas.microsoft.com/office/powerpoint/2010/main" Requires="p14">
+      <p:transition spd="slow" p14:dur="2000"/>
+    </mc:Choice>
+    <mc:Fallback>
+      <p:transition xmlns:p14="http://schemas.microsoft.com/office/powerpoint/2010/main" spd="slow"/>
+    </mc:Fallback>
+  </mc:AlternateContent>
   <p:timing>
     <p:tnLst>
       <p:par>
@@ -21244,8 +21135,8 @@
         </p:nvSpPr>
         <p:spPr>
           <a:xfrm>
-            <a:off x="457200" y="541196"/>
-            <a:ext cx="8416360" cy="2140067"/>
+            <a:off x="457200" y="122096"/>
+            <a:ext cx="8416360" cy="2583004"/>
           </a:xfrm>
           <a:solidFill>
             <a:schemeClr val="bg1"/>
@@ -21261,9 +21152,6 @@
               <a:rPr lang="en-US" dirty="0" smtClean="0"/>
               <a:t>Types of mutations</a:t>
             </a:r>
-            <a:br>
-              <a:rPr lang="en-US" dirty="0" smtClean="0"/>
-            </a:br>
             <a:r>
               <a:rPr lang="en-US" dirty="0"/>
               <a:t/>

</xml_diff>